<commit_message>
feat: OIDC workflow w/ Okta
</commit_message>
<xml_diff>
--- a/docs/img/nginx-oidc-flow.pptx
+++ b/docs/img/nginx-oidc-flow.pptx
@@ -259,7 +259,7 @@
           <a:p>
             <a:fld id="{FD36D0CE-793F-FB41-AD4F-0C45D94A4FBD}" type="datetimeFigureOut">
               <a:rPr lang="en-US" smtClean="0"/>
-              <a:t>9/15/22</a:t>
+              <a:t>9/21/22</a:t>
             </a:fld>
             <a:endParaRPr lang="en-US"/>
           </a:p>
@@ -457,7 +457,7 @@
           <a:p>
             <a:fld id="{FD36D0CE-793F-FB41-AD4F-0C45D94A4FBD}" type="datetimeFigureOut">
               <a:rPr lang="en-US" smtClean="0"/>
-              <a:t>9/15/22</a:t>
+              <a:t>9/21/22</a:t>
             </a:fld>
             <a:endParaRPr lang="en-US"/>
           </a:p>
@@ -665,7 +665,7 @@
           <a:p>
             <a:fld id="{FD36D0CE-793F-FB41-AD4F-0C45D94A4FBD}" type="datetimeFigureOut">
               <a:rPr lang="en-US" smtClean="0"/>
-              <a:t>9/15/22</a:t>
+              <a:t>9/21/22</a:t>
             </a:fld>
             <a:endParaRPr lang="en-US"/>
           </a:p>
@@ -863,7 +863,7 @@
           <a:p>
             <a:fld id="{FD36D0CE-793F-FB41-AD4F-0C45D94A4FBD}" type="datetimeFigureOut">
               <a:rPr lang="en-US" smtClean="0"/>
-              <a:t>9/15/22</a:t>
+              <a:t>9/21/22</a:t>
             </a:fld>
             <a:endParaRPr lang="en-US"/>
           </a:p>
@@ -1138,7 +1138,7 @@
           <a:p>
             <a:fld id="{FD36D0CE-793F-FB41-AD4F-0C45D94A4FBD}" type="datetimeFigureOut">
               <a:rPr lang="en-US" smtClean="0"/>
-              <a:t>9/15/22</a:t>
+              <a:t>9/21/22</a:t>
             </a:fld>
             <a:endParaRPr lang="en-US"/>
           </a:p>
@@ -1403,7 +1403,7 @@
           <a:p>
             <a:fld id="{FD36D0CE-793F-FB41-AD4F-0C45D94A4FBD}" type="datetimeFigureOut">
               <a:rPr lang="en-US" smtClean="0"/>
-              <a:t>9/15/22</a:t>
+              <a:t>9/21/22</a:t>
             </a:fld>
             <a:endParaRPr lang="en-US"/>
           </a:p>
@@ -1815,7 +1815,7 @@
           <a:p>
             <a:fld id="{FD36D0CE-793F-FB41-AD4F-0C45D94A4FBD}" type="datetimeFigureOut">
               <a:rPr lang="en-US" smtClean="0"/>
-              <a:t>9/15/22</a:t>
+              <a:t>9/21/22</a:t>
             </a:fld>
             <a:endParaRPr lang="en-US"/>
           </a:p>
@@ -1956,7 +1956,7 @@
           <a:p>
             <a:fld id="{FD36D0CE-793F-FB41-AD4F-0C45D94A4FBD}" type="datetimeFigureOut">
               <a:rPr lang="en-US" smtClean="0"/>
-              <a:t>9/15/22</a:t>
+              <a:t>9/21/22</a:t>
             </a:fld>
             <a:endParaRPr lang="en-US"/>
           </a:p>
@@ -2069,7 +2069,7 @@
           <a:p>
             <a:fld id="{FD36D0CE-793F-FB41-AD4F-0C45D94A4FBD}" type="datetimeFigureOut">
               <a:rPr lang="en-US" smtClean="0"/>
-              <a:t>9/15/22</a:t>
+              <a:t>9/21/22</a:t>
             </a:fld>
             <a:endParaRPr lang="en-US"/>
           </a:p>
@@ -2380,7 +2380,7 @@
           <a:p>
             <a:fld id="{FD36D0CE-793F-FB41-AD4F-0C45D94A4FBD}" type="datetimeFigureOut">
               <a:rPr lang="en-US" smtClean="0"/>
-              <a:t>9/15/22</a:t>
+              <a:t>9/21/22</a:t>
             </a:fld>
             <a:endParaRPr lang="en-US"/>
           </a:p>
@@ -2668,7 +2668,7 @@
           <a:p>
             <a:fld id="{FD36D0CE-793F-FB41-AD4F-0C45D94A4FBD}" type="datetimeFigureOut">
               <a:rPr lang="en-US" smtClean="0"/>
-              <a:t>9/15/22</a:t>
+              <a:t>9/21/22</a:t>
             </a:fld>
             <a:endParaRPr lang="en-US"/>
           </a:p>
@@ -2909,7 +2909,7 @@
           <a:p>
             <a:fld id="{FD36D0CE-793F-FB41-AD4F-0C45D94A4FBD}" type="datetimeFigureOut">
               <a:rPr lang="en-US" smtClean="0"/>
-              <a:t>9/15/22</a:t>
+              <a:t>9/21/22</a:t>
             </a:fld>
             <a:endParaRPr lang="en-US"/>
           </a:p>
@@ -5952,53 +5952,6 @@
           </a:p>
         </p:txBody>
       </p:sp>
-      <p:pic>
-        <p:nvPicPr>
-          <p:cNvPr id="1026" name="Picture 2" descr="AWS — Improving System Resilience While Being Commercially Reasonable. | by  Dishan Metihakwala | Medium">
-            <a:extLst>
-              <a:ext uri="{FF2B5EF4-FFF2-40B4-BE49-F238E27FC236}">
-                <a16:creationId xmlns:a16="http://schemas.microsoft.com/office/drawing/2014/main" id="{F37DE23A-1C0C-3FFD-8856-B2371A5B0C00}"/>
-              </a:ext>
-            </a:extLst>
-          </p:cNvPr>
-          <p:cNvPicPr>
-            <a:picLocks noChangeAspect="1" noChangeArrowheads="1"/>
-          </p:cNvPicPr>
-          <p:nvPr/>
-        </p:nvPicPr>
-        <p:blipFill>
-          <a:blip r:embed="rId9">
-            <a:extLst>
-              <a:ext uri="{28A0092B-C50C-407E-A947-70E740481C1C}">
-                <a14:useLocalDpi xmlns:a14="http://schemas.microsoft.com/office/drawing/2010/main" val="0"/>
-              </a:ext>
-            </a:extLst>
-          </a:blip>
-          <a:srcRect/>
-          <a:stretch>
-            <a:fillRect/>
-          </a:stretch>
-        </p:blipFill>
-        <p:spPr bwMode="auto">
-          <a:xfrm>
-            <a:off x="7458894" y="1733570"/>
-            <a:ext cx="854209" cy="760892"/>
-          </a:xfrm>
-          <a:prstGeom prst="rect">
-            <a:avLst/>
-          </a:prstGeom>
-          <a:noFill/>
-          <a:extLst>
-            <a:ext uri="{909E8E84-426E-40DD-AFC4-6F175D3DCCD1}">
-              <a14:hiddenFill xmlns:a14="http://schemas.microsoft.com/office/drawing/2010/main">
-                <a:solidFill>
-                  <a:srgbClr val="FFFFFF"/>
-                </a:solidFill>
-              </a14:hiddenFill>
-            </a:ext>
-          </a:extLst>
-        </p:spPr>
-      </p:pic>
       <p:sp>
         <p:nvSpPr>
           <p:cNvPr id="57" name="직사각형 363">
@@ -6056,6 +6009,53 @@
           </a:p>
         </p:txBody>
       </p:sp>
+      <p:pic>
+        <p:nvPicPr>
+          <p:cNvPr id="3" name="Picture 2" descr="Okta Identity Management Review | PCMag">
+            <a:extLst>
+              <a:ext uri="{FF2B5EF4-FFF2-40B4-BE49-F238E27FC236}">
+                <a16:creationId xmlns:a16="http://schemas.microsoft.com/office/drawing/2014/main" id="{21E41C5C-BD37-49A7-9EEC-DC6DB522F138}"/>
+              </a:ext>
+            </a:extLst>
+          </p:cNvPr>
+          <p:cNvPicPr>
+            <a:picLocks noChangeAspect="1" noChangeArrowheads="1"/>
+          </p:cNvPicPr>
+          <p:nvPr/>
+        </p:nvPicPr>
+        <p:blipFill>
+          <a:blip r:embed="rId9">
+            <a:extLst>
+              <a:ext uri="{28A0092B-C50C-407E-A947-70E740481C1C}">
+                <a14:useLocalDpi xmlns:a14="http://schemas.microsoft.com/office/drawing/2010/main" val="0"/>
+              </a:ext>
+            </a:extLst>
+          </a:blip>
+          <a:srcRect/>
+          <a:stretch>
+            <a:fillRect/>
+          </a:stretch>
+        </p:blipFill>
+        <p:spPr bwMode="auto">
+          <a:xfrm>
+            <a:off x="7436566" y="1797800"/>
+            <a:ext cx="901718" cy="506651"/>
+          </a:xfrm>
+          <a:prstGeom prst="rect">
+            <a:avLst/>
+          </a:prstGeom>
+          <a:noFill/>
+          <a:extLst>
+            <a:ext uri="{909E8E84-426E-40DD-AFC4-6F175D3DCCD1}">
+              <a14:hiddenFill xmlns:a14="http://schemas.microsoft.com/office/drawing/2010/main">
+                <a:solidFill>
+                  <a:srgbClr val="FFFFFF"/>
+                </a:solidFill>
+              </a14:hiddenFill>
+            </a:ext>
+          </a:extLst>
+        </p:spPr>
+      </p:pic>
     </p:spTree>
     <p:extLst>
       <p:ext uri="{BB962C8B-B14F-4D97-AF65-F5344CB8AC3E}">

</xml_diff>